<commit_message>
Create default data in database.
</commit_message>
<xml_diff>
--- a/SupportFiles/Workflow.pptx
+++ b/SupportFiles/Workflow.pptx
@@ -6185,18 +6185,9 @@
           <a:p>
             <a:pPr lvl="1"/>
             <a:r>
-              <a:rPr lang="en-GB" smtClean="0"/>
-              <a:t>Visual Studio view -&gt; </a:t>
-            </a:r>
-            <a:r>
               <a:rPr lang="en-GB" dirty="0" smtClean="0"/>
-              <a:t>Output -&gt; </a:t>
-            </a:r>
-            <a:r>
-              <a:rPr lang="en-GB" smtClean="0"/>
-              <a:t>Service Dependencies</a:t>
-            </a:r>
-            <a:endParaRPr lang="en-GB" dirty="0" smtClean="0"/>
+              <a:t>Visual Studio view -&gt; Output -&gt; Service Dependencies</a:t>
+            </a:r>
           </a:p>
           <a:p>
             <a:r>
@@ -6278,8 +6269,12 @@
               <a:t>Output status (</a:t>
             </a:r>
             <a:r>
+              <a:rPr lang="en-GB" dirty="0" err="1"/>
+              <a:t>S</a:t>
+            </a:r>
+            <a:r>
               <a:rPr lang="en-GB" dirty="0" err="1" smtClean="0"/>
-              <a:t>stateful</a:t>
+              <a:t>tateful</a:t>
             </a:r>
             <a:r>
               <a:rPr lang="en-GB" dirty="0" smtClean="0"/>

</xml_diff>